<commit_message>
add feature space visualization to presentation
</commit_message>
<xml_diff>
--- a/presentation/ml_trains_deep.pptx
+++ b/presentation/ml_trains_deep.pptx
@@ -17,16 +17,19 @@
     <p:sldId id="265" r:id="rId11"/>
     <p:sldId id="266" r:id="rId12"/>
     <p:sldId id="267" r:id="rId13"/>
-    <p:sldId id="268" r:id="rId14"/>
-    <p:sldId id="269" r:id="rId15"/>
-    <p:sldId id="270" r:id="rId16"/>
-    <p:sldId id="271" r:id="rId17"/>
-    <p:sldId id="272" r:id="rId18"/>
-    <p:sldId id="273" r:id="rId19"/>
-    <p:sldId id="274" r:id="rId20"/>
-    <p:sldId id="275" r:id="rId21"/>
-    <p:sldId id="276" r:id="rId22"/>
-    <p:sldId id="277" r:id="rId23"/>
+    <p:sldId id="278" r:id="rId14"/>
+    <p:sldId id="279" r:id="rId15"/>
+    <p:sldId id="280" r:id="rId16"/>
+    <p:sldId id="268" r:id="rId17"/>
+    <p:sldId id="269" r:id="rId18"/>
+    <p:sldId id="270" r:id="rId19"/>
+    <p:sldId id="271" r:id="rId20"/>
+    <p:sldId id="272" r:id="rId21"/>
+    <p:sldId id="273" r:id="rId22"/>
+    <p:sldId id="274" r:id="rId23"/>
+    <p:sldId id="275" r:id="rId24"/>
+    <p:sldId id="276" r:id="rId25"/>
+    <p:sldId id="277" r:id="rId26"/>
   </p:sldIdLst>
   <p:sldSz cx="9144000" cy="6858000" type="screen4x3"/>
   <p:notesSz cx="6858000" cy="9144000"/>
@@ -150,10 +153,13 @@
             <p14:sldId id="265"/>
           </p14:sldIdLst>
         </p14:section>
-        <p14:section name="our ask" id="{DFFC6651-7C65-4422-8607-2B64411A3244}">
+        <p14:section name="our task" id="{DFFC6651-7C65-4422-8607-2B64411A3244}">
           <p14:sldIdLst>
             <p14:sldId id="266"/>
             <p14:sldId id="267"/>
+            <p14:sldId id="278"/>
+            <p14:sldId id="279"/>
+            <p14:sldId id="280"/>
             <p14:sldId id="268"/>
             <p14:sldId id="269"/>
             <p14:sldId id="270"/>
@@ -357,7 +363,7 @@
           <a:p>
             <a:fld id="{B4C71EC6-210F-42DE-9C53-41977AD35B3D}" type="datetimeFigureOut">
               <a:rPr lang="ru-RU" smtClean="0"/>
-              <a:t>31.10.2019</a:t>
+              <a:t>02.11.2019</a:t>
             </a:fld>
             <a:endParaRPr lang="ru-RU"/>
           </a:p>
@@ -522,7 +528,7 @@
           <a:p>
             <a:fld id="{B4C71EC6-210F-42DE-9C53-41977AD35B3D}" type="datetimeFigureOut">
               <a:rPr lang="ru-RU" smtClean="0"/>
-              <a:t>31.10.2019</a:t>
+              <a:t>02.11.2019</a:t>
             </a:fld>
             <a:endParaRPr lang="ru-RU"/>
           </a:p>
@@ -697,7 +703,7 @@
           <a:p>
             <a:fld id="{B4C71EC6-210F-42DE-9C53-41977AD35B3D}" type="datetimeFigureOut">
               <a:rPr lang="ru-RU" smtClean="0"/>
-              <a:t>31.10.2019</a:t>
+              <a:t>02.11.2019</a:t>
             </a:fld>
             <a:endParaRPr lang="ru-RU"/>
           </a:p>
@@ -862,7 +868,7 @@
           <a:p>
             <a:fld id="{B4C71EC6-210F-42DE-9C53-41977AD35B3D}" type="datetimeFigureOut">
               <a:rPr lang="ru-RU" smtClean="0"/>
-              <a:t>31.10.2019</a:t>
+              <a:t>02.11.2019</a:t>
             </a:fld>
             <a:endParaRPr lang="ru-RU"/>
           </a:p>
@@ -1103,7 +1109,7 @@
           <a:p>
             <a:fld id="{B4C71EC6-210F-42DE-9C53-41977AD35B3D}" type="datetimeFigureOut">
               <a:rPr lang="ru-RU" smtClean="0"/>
-              <a:t>31.10.2019</a:t>
+              <a:t>02.11.2019</a:t>
             </a:fld>
             <a:endParaRPr lang="ru-RU"/>
           </a:p>
@@ -1386,7 +1392,7 @@
           <a:p>
             <a:fld id="{B4C71EC6-210F-42DE-9C53-41977AD35B3D}" type="datetimeFigureOut">
               <a:rPr lang="ru-RU" smtClean="0"/>
-              <a:t>31.10.2019</a:t>
+              <a:t>02.11.2019</a:t>
             </a:fld>
             <a:endParaRPr lang="ru-RU"/>
           </a:p>
@@ -1803,7 +1809,7 @@
           <a:p>
             <a:fld id="{B4C71EC6-210F-42DE-9C53-41977AD35B3D}" type="datetimeFigureOut">
               <a:rPr lang="ru-RU" smtClean="0"/>
-              <a:t>31.10.2019</a:t>
+              <a:t>02.11.2019</a:t>
             </a:fld>
             <a:endParaRPr lang="ru-RU"/>
           </a:p>
@@ -1916,7 +1922,7 @@
           <a:p>
             <a:fld id="{B4C71EC6-210F-42DE-9C53-41977AD35B3D}" type="datetimeFigureOut">
               <a:rPr lang="ru-RU" smtClean="0"/>
-              <a:t>31.10.2019</a:t>
+              <a:t>02.11.2019</a:t>
             </a:fld>
             <a:endParaRPr lang="ru-RU"/>
           </a:p>
@@ -2006,7 +2012,7 @@
           <a:p>
             <a:fld id="{B4C71EC6-210F-42DE-9C53-41977AD35B3D}" type="datetimeFigureOut">
               <a:rPr lang="ru-RU" smtClean="0"/>
-              <a:t>31.10.2019</a:t>
+              <a:t>02.11.2019</a:t>
             </a:fld>
             <a:endParaRPr lang="ru-RU"/>
           </a:p>
@@ -2278,7 +2284,7 @@
           <a:p>
             <a:fld id="{B4C71EC6-210F-42DE-9C53-41977AD35B3D}" type="datetimeFigureOut">
               <a:rPr lang="ru-RU" smtClean="0"/>
-              <a:t>31.10.2019</a:t>
+              <a:t>02.11.2019</a:t>
             </a:fld>
             <a:endParaRPr lang="ru-RU"/>
           </a:p>
@@ -2526,7 +2532,7 @@
           <a:p>
             <a:fld id="{B4C71EC6-210F-42DE-9C53-41977AD35B3D}" type="datetimeFigureOut">
               <a:rPr lang="ru-RU" smtClean="0"/>
-              <a:t>31.10.2019</a:t>
+              <a:t>02.11.2019</a:t>
             </a:fld>
             <a:endParaRPr lang="ru-RU"/>
           </a:p>
@@ -2734,7 +2740,7 @@
           <a:p>
             <a:fld id="{B4C71EC6-210F-42DE-9C53-41977AD35B3D}" type="datetimeFigureOut">
               <a:rPr lang="ru-RU" smtClean="0"/>
-              <a:t>31.10.2019</a:t>
+              <a:t>02.11.2019</a:t>
             </a:fld>
             <a:endParaRPr lang="ru-RU"/>
           </a:p>
@@ -3652,6 +3658,365 @@
 </file>
 
 <file path=ppt/slides/slide13.xml><?xml version="1.0" encoding="utf-8"?>
+<p:sld xmlns:a="http://schemas.openxmlformats.org/drawingml/2006/main" xmlns:r="http://schemas.openxmlformats.org/officeDocument/2006/relationships" xmlns:p="http://schemas.openxmlformats.org/presentationml/2006/main" show="0">
+  <p:cSld>
+    <p:spTree>
+      <p:nvGrpSpPr>
+        <p:cNvPr id="1" name=""/>
+        <p:cNvGrpSpPr/>
+        <p:nvPr/>
+      </p:nvGrpSpPr>
+      <p:grpSpPr>
+        <a:xfrm>
+          <a:off x="0" y="0"/>
+          <a:ext cx="0" cy="0"/>
+          <a:chOff x="0" y="0"/>
+          <a:chExt cx="0" cy="0"/>
+        </a:xfrm>
+      </p:grpSpPr>
+      <p:pic>
+        <p:nvPicPr>
+          <p:cNvPr id="1026" name="Picture 2"/>
+          <p:cNvPicPr>
+            <a:picLocks noChangeAspect="1" noChangeArrowheads="1"/>
+          </p:cNvPicPr>
+          <p:nvPr/>
+        </p:nvPicPr>
+        <p:blipFill>
+          <a:blip r:embed="rId2">
+            <a:extLst>
+              <a:ext uri="{28A0092B-C50C-407E-A947-70E740481C1C}">
+                <a14:useLocalDpi xmlns:a14="http://schemas.microsoft.com/office/drawing/2010/main" val="0"/>
+              </a:ext>
+            </a:extLst>
+          </a:blip>
+          <a:srcRect/>
+          <a:stretch>
+            <a:fillRect/>
+          </a:stretch>
+        </p:blipFill>
+        <p:spPr bwMode="auto">
+          <a:xfrm>
+            <a:off x="251519" y="1268760"/>
+            <a:ext cx="8894337" cy="4622254"/>
+          </a:xfrm>
+          <a:prstGeom prst="rect">
+            <a:avLst/>
+          </a:prstGeom>
+          <a:noFill/>
+          <a:ln>
+            <a:noFill/>
+          </a:ln>
+          <a:extLst>
+            <a:ext uri="{909E8E84-426E-40DD-AFC4-6F175D3DCCD1}">
+              <a14:hiddenFill xmlns:a14="http://schemas.microsoft.com/office/drawing/2010/main">
+                <a:solidFill>
+                  <a:schemeClr val="accent1"/>
+                </a:solidFill>
+              </a14:hiddenFill>
+            </a:ext>
+            <a:ext uri="{91240B29-F687-4F45-9708-019B960494DF}">
+              <a14:hiddenLine xmlns:a14="http://schemas.microsoft.com/office/drawing/2010/main" w="9525">
+                <a:solidFill>
+                  <a:schemeClr val="tx1"/>
+                </a:solidFill>
+                <a:miter lim="800000"/>
+                <a:headEnd/>
+                <a:tailEnd/>
+              </a14:hiddenLine>
+            </a:ext>
+          </a:extLst>
+        </p:spPr>
+      </p:pic>
+      <p:sp>
+        <p:nvSpPr>
+          <p:cNvPr id="5" name="Заголовок 1"/>
+          <p:cNvSpPr>
+            <a:spLocks noGrp="1"/>
+          </p:cNvSpPr>
+          <p:nvPr>
+            <p:ph type="title"/>
+          </p:nvPr>
+        </p:nvSpPr>
+        <p:spPr>
+          <a:xfrm>
+            <a:off x="457200" y="274638"/>
+            <a:ext cx="8229600" cy="1143000"/>
+          </a:xfrm>
+        </p:spPr>
+        <p:txBody>
+          <a:bodyPr/>
+          <a:lstStyle/>
+          <a:p>
+            <a:r>
+              <a:rPr lang="en-US" dirty="0" smtClean="0"/>
+              <a:t>Logistic Regression</a:t>
+            </a:r>
+            <a:endParaRPr lang="ru-RU" dirty="0"/>
+          </a:p>
+        </p:txBody>
+      </p:sp>
+    </p:spTree>
+    <p:extLst>
+      <p:ext uri="{BB962C8B-B14F-4D97-AF65-F5344CB8AC3E}">
+        <p14:creationId xmlns:p14="http://schemas.microsoft.com/office/powerpoint/2010/main" val="921711547"/>
+      </p:ext>
+    </p:extLst>
+  </p:cSld>
+  <p:clrMapOvr>
+    <a:masterClrMapping/>
+  </p:clrMapOvr>
+  <mc:AlternateContent xmlns:mc="http://schemas.openxmlformats.org/markup-compatibility/2006">
+    <mc:Choice xmlns:p14="http://schemas.microsoft.com/office/powerpoint/2010/main" Requires="p14">
+      <p:transition spd="slow" p14:dur="2000"/>
+    </mc:Choice>
+    <mc:Fallback>
+      <p:transition spd="slow"/>
+    </mc:Fallback>
+  </mc:AlternateContent>
+  <p:timing>
+    <p:tnLst>
+      <p:par>
+        <p:cTn id="1" dur="indefinite" restart="never" nodeType="tmRoot"/>
+      </p:par>
+    </p:tnLst>
+  </p:timing>
+</p:sld>
+</file>
+
+<file path=ppt/slides/slide14.xml><?xml version="1.0" encoding="utf-8"?>
+<p:sld xmlns:a="http://schemas.openxmlformats.org/drawingml/2006/main" xmlns:r="http://schemas.openxmlformats.org/officeDocument/2006/relationships" xmlns:p="http://schemas.openxmlformats.org/presentationml/2006/main" show="0">
+  <p:cSld>
+    <p:spTree>
+      <p:nvGrpSpPr>
+        <p:cNvPr id="1" name=""/>
+        <p:cNvGrpSpPr/>
+        <p:nvPr/>
+      </p:nvGrpSpPr>
+      <p:grpSpPr>
+        <a:xfrm>
+          <a:off x="0" y="0"/>
+          <a:ext cx="0" cy="0"/>
+          <a:chOff x="0" y="0"/>
+          <a:chExt cx="0" cy="0"/>
+        </a:xfrm>
+      </p:grpSpPr>
+      <p:pic>
+        <p:nvPicPr>
+          <p:cNvPr id="2050" name="Picture 2" descr="Картинки по запросу random forest feature space"/>
+          <p:cNvPicPr>
+            <a:picLocks noChangeAspect="1" noChangeArrowheads="1"/>
+          </p:cNvPicPr>
+          <p:nvPr/>
+        </p:nvPicPr>
+        <p:blipFill>
+          <a:blip r:embed="rId2">
+            <a:extLst>
+              <a:ext uri="{28A0092B-C50C-407E-A947-70E740481C1C}">
+                <a14:useLocalDpi xmlns:a14="http://schemas.microsoft.com/office/drawing/2010/main" val="0"/>
+              </a:ext>
+            </a:extLst>
+          </a:blip>
+          <a:srcRect/>
+          <a:stretch>
+            <a:fillRect/>
+          </a:stretch>
+        </p:blipFill>
+        <p:spPr bwMode="auto">
+          <a:xfrm>
+            <a:off x="1865173" y="1340768"/>
+            <a:ext cx="5167635" cy="5167636"/>
+          </a:xfrm>
+          <a:prstGeom prst="rect">
+            <a:avLst/>
+          </a:prstGeom>
+          <a:noFill/>
+          <a:extLst>
+            <a:ext uri="{909E8E84-426E-40DD-AFC4-6F175D3DCCD1}">
+              <a14:hiddenFill xmlns:a14="http://schemas.microsoft.com/office/drawing/2010/main">
+                <a:solidFill>
+                  <a:srgbClr val="FFFFFF"/>
+                </a:solidFill>
+              </a14:hiddenFill>
+            </a:ext>
+          </a:extLst>
+        </p:spPr>
+      </p:pic>
+      <p:sp>
+        <p:nvSpPr>
+          <p:cNvPr id="5" name="Заголовок 1"/>
+          <p:cNvSpPr>
+            <a:spLocks noGrp="1"/>
+          </p:cNvSpPr>
+          <p:nvPr>
+            <p:ph type="title"/>
+          </p:nvPr>
+        </p:nvSpPr>
+        <p:spPr>
+          <a:xfrm>
+            <a:off x="467544" y="116632"/>
+            <a:ext cx="8229600" cy="1143000"/>
+          </a:xfrm>
+        </p:spPr>
+        <p:txBody>
+          <a:bodyPr>
+            <a:normAutofit/>
+          </a:bodyPr>
+          <a:lstStyle/>
+          <a:p>
+            <a:r>
+              <a:rPr lang="en-US" dirty="0" smtClean="0"/>
+              <a:t>Random Forest</a:t>
+            </a:r>
+            <a:endParaRPr lang="ru-RU" dirty="0"/>
+          </a:p>
+        </p:txBody>
+      </p:sp>
+    </p:spTree>
+    <p:extLst>
+      <p:ext uri="{BB962C8B-B14F-4D97-AF65-F5344CB8AC3E}">
+        <p14:creationId xmlns:p14="http://schemas.microsoft.com/office/powerpoint/2010/main" val="2869109930"/>
+      </p:ext>
+    </p:extLst>
+  </p:cSld>
+  <p:clrMapOvr>
+    <a:masterClrMapping/>
+  </p:clrMapOvr>
+  <mc:AlternateContent xmlns:mc="http://schemas.openxmlformats.org/markup-compatibility/2006">
+    <mc:Choice xmlns:p14="http://schemas.microsoft.com/office/powerpoint/2010/main" Requires="p14">
+      <p:transition spd="slow" p14:dur="2000"/>
+    </mc:Choice>
+    <mc:Fallback>
+      <p:transition spd="slow"/>
+    </mc:Fallback>
+  </mc:AlternateContent>
+  <p:timing>
+    <p:tnLst>
+      <p:par>
+        <p:cTn id="1" dur="indefinite" restart="never" nodeType="tmRoot"/>
+      </p:par>
+    </p:tnLst>
+  </p:timing>
+</p:sld>
+</file>
+
+<file path=ppt/slides/slide15.xml><?xml version="1.0" encoding="utf-8"?>
+<p:sld xmlns:a="http://schemas.openxmlformats.org/drawingml/2006/main" xmlns:r="http://schemas.openxmlformats.org/officeDocument/2006/relationships" xmlns:p="http://schemas.openxmlformats.org/presentationml/2006/main" show="0">
+  <p:cSld>
+    <p:spTree>
+      <p:nvGrpSpPr>
+        <p:cNvPr id="1" name=""/>
+        <p:cNvGrpSpPr/>
+        <p:nvPr/>
+      </p:nvGrpSpPr>
+      <p:grpSpPr>
+        <a:xfrm>
+          <a:off x="0" y="0"/>
+          <a:ext cx="0" cy="0"/>
+          <a:chOff x="0" y="0"/>
+          <a:chExt cx="0" cy="0"/>
+        </a:xfrm>
+      </p:grpSpPr>
+      <p:pic>
+        <p:nvPicPr>
+          <p:cNvPr id="3074" name="Picture 2" descr="Картинки по запросу perceptron feature space"/>
+          <p:cNvPicPr>
+            <a:picLocks noChangeAspect="1" noChangeArrowheads="1"/>
+          </p:cNvPicPr>
+          <p:nvPr/>
+        </p:nvPicPr>
+        <p:blipFill>
+          <a:blip r:embed="rId2">
+            <a:extLst>
+              <a:ext uri="{28A0092B-C50C-407E-A947-70E740481C1C}">
+                <a14:useLocalDpi xmlns:a14="http://schemas.microsoft.com/office/drawing/2010/main" val="0"/>
+              </a:ext>
+            </a:extLst>
+          </a:blip>
+          <a:srcRect/>
+          <a:stretch>
+            <a:fillRect/>
+          </a:stretch>
+        </p:blipFill>
+        <p:spPr bwMode="auto">
+          <a:xfrm>
+            <a:off x="611560" y="1888631"/>
+            <a:ext cx="8043974" cy="3251821"/>
+          </a:xfrm>
+          <a:prstGeom prst="rect">
+            <a:avLst/>
+          </a:prstGeom>
+          <a:noFill/>
+          <a:extLst>
+            <a:ext uri="{909E8E84-426E-40DD-AFC4-6F175D3DCCD1}">
+              <a14:hiddenFill xmlns:a14="http://schemas.microsoft.com/office/drawing/2010/main">
+                <a:solidFill>
+                  <a:srgbClr val="FFFFFF"/>
+                </a:solidFill>
+              </a14:hiddenFill>
+            </a:ext>
+          </a:extLst>
+        </p:spPr>
+      </p:pic>
+      <p:sp>
+        <p:nvSpPr>
+          <p:cNvPr id="5" name="Заголовок 1"/>
+          <p:cNvSpPr>
+            <a:spLocks noGrp="1"/>
+          </p:cNvSpPr>
+          <p:nvPr>
+            <p:ph type="title"/>
+          </p:nvPr>
+        </p:nvSpPr>
+        <p:spPr>
+          <a:xfrm>
+            <a:off x="467544" y="116632"/>
+            <a:ext cx="8229600" cy="1143000"/>
+          </a:xfrm>
+        </p:spPr>
+        <p:txBody>
+          <a:bodyPr>
+            <a:normAutofit/>
+          </a:bodyPr>
+          <a:lstStyle/>
+          <a:p>
+            <a:r>
+              <a:rPr lang="en-US" dirty="0" smtClean="0"/>
+              <a:t>Perceptron</a:t>
+            </a:r>
+            <a:endParaRPr lang="ru-RU" dirty="0"/>
+          </a:p>
+        </p:txBody>
+      </p:sp>
+    </p:spTree>
+    <p:extLst>
+      <p:ext uri="{BB962C8B-B14F-4D97-AF65-F5344CB8AC3E}">
+        <p14:creationId xmlns:p14="http://schemas.microsoft.com/office/powerpoint/2010/main" val="3634148971"/>
+      </p:ext>
+    </p:extLst>
+  </p:cSld>
+  <p:clrMapOvr>
+    <a:masterClrMapping/>
+  </p:clrMapOvr>
+  <mc:AlternateContent xmlns:mc="http://schemas.openxmlformats.org/markup-compatibility/2006">
+    <mc:Choice xmlns:p14="http://schemas.microsoft.com/office/powerpoint/2010/main" Requires="p14">
+      <p:transition spd="slow" p14:dur="2000"/>
+    </mc:Choice>
+    <mc:Fallback>
+      <p:transition spd="slow"/>
+    </mc:Fallback>
+  </mc:AlternateContent>
+  <p:timing>
+    <p:tnLst>
+      <p:par>
+        <p:cTn id="1" dur="indefinite" restart="never" nodeType="tmRoot"/>
+      </p:par>
+    </p:tnLst>
+  </p:timing>
+</p:sld>
+</file>
+
+<file path=ppt/slides/slide16.xml><?xml version="1.0" encoding="utf-8"?>
 <p:sld xmlns:a="http://schemas.openxmlformats.org/drawingml/2006/main" xmlns:r="http://schemas.openxmlformats.org/officeDocument/2006/relationships" xmlns:p="http://schemas.openxmlformats.org/presentationml/2006/main">
   <p:cSld>
     <p:spTree>
@@ -3931,7 +4296,7 @@
 </p:sld>
 </file>
 
-<file path=ppt/slides/slide14.xml><?xml version="1.0" encoding="utf-8"?>
+<file path=ppt/slides/slide17.xml><?xml version="1.0" encoding="utf-8"?>
 <p:sld xmlns:a="http://schemas.openxmlformats.org/drawingml/2006/main" xmlns:r="http://schemas.openxmlformats.org/officeDocument/2006/relationships" xmlns:p="http://schemas.openxmlformats.org/presentationml/2006/main">
   <p:cSld>
     <p:spTree>
@@ -4047,7 +4412,7 @@
 </p:sld>
 </file>
 
-<file path=ppt/slides/slide15.xml><?xml version="1.0" encoding="utf-8"?>
+<file path=ppt/slides/slide18.xml><?xml version="1.0" encoding="utf-8"?>
 <p:sld xmlns:a="http://schemas.openxmlformats.org/drawingml/2006/main" xmlns:r="http://schemas.openxmlformats.org/officeDocument/2006/relationships" xmlns:p="http://schemas.openxmlformats.org/presentationml/2006/main">
   <p:cSld>
     <p:spTree>
@@ -4084,7 +4449,7 @@
 </p:sld>
 </file>
 
-<file path=ppt/slides/slide16.xml><?xml version="1.0" encoding="utf-8"?>
+<file path=ppt/slides/slide19.xml><?xml version="1.0" encoding="utf-8"?>
 <p:sld xmlns:a="http://schemas.openxmlformats.org/drawingml/2006/main" xmlns:r="http://schemas.openxmlformats.org/officeDocument/2006/relationships" xmlns:p="http://schemas.openxmlformats.org/presentationml/2006/main">
   <p:cSld>
     <p:spTree>
@@ -4149,7 +4514,149 @@
 </p:sld>
 </file>
 
-<file path=ppt/slides/slide17.xml><?xml version="1.0" encoding="utf-8"?>
+<file path=ppt/slides/slide2.xml><?xml version="1.0" encoding="utf-8"?>
+<p:sld xmlns:a="http://schemas.openxmlformats.org/drawingml/2006/main" xmlns:r="http://schemas.openxmlformats.org/officeDocument/2006/relationships" xmlns:p="http://schemas.openxmlformats.org/presentationml/2006/main">
+  <p:cSld>
+    <p:spTree>
+      <p:nvGrpSpPr>
+        <p:cNvPr id="1" name=""/>
+        <p:cNvGrpSpPr/>
+        <p:nvPr/>
+      </p:nvGrpSpPr>
+      <p:grpSpPr>
+        <a:xfrm>
+          <a:off x="0" y="0"/>
+          <a:ext cx="0" cy="0"/>
+          <a:chOff x="0" y="0"/>
+          <a:chExt cx="0" cy="0"/>
+        </a:xfrm>
+      </p:grpSpPr>
+      <p:sp>
+        <p:nvSpPr>
+          <p:cNvPr id="3" name="Объект 2"/>
+          <p:cNvSpPr>
+            <a:spLocks noGrp="1"/>
+          </p:cNvSpPr>
+          <p:nvPr>
+            <p:ph idx="1"/>
+          </p:nvPr>
+        </p:nvSpPr>
+        <p:spPr>
+          <a:xfrm>
+            <a:off x="467544" y="1124744"/>
+            <a:ext cx="8229600" cy="4525963"/>
+          </a:xfrm>
+        </p:spPr>
+        <p:txBody>
+          <a:bodyPr/>
+          <a:lstStyle/>
+          <a:p>
+            <a:pPr>
+              <a:lnSpc>
+                <a:spcPct val="150000"/>
+              </a:lnSpc>
+            </a:pPr>
+            <a:r>
+              <a:rPr lang="ru-RU" dirty="0" smtClean="0"/>
+              <a:t>что такое «машинка»?</a:t>
+            </a:r>
+          </a:p>
+          <a:p>
+            <a:pPr>
+              <a:lnSpc>
+                <a:spcPct val="150000"/>
+              </a:lnSpc>
+            </a:pPr>
+            <a:r>
+              <a:rPr lang="ru-RU" dirty="0" smtClean="0"/>
+              <a:t>почему </a:t>
+            </a:r>
+            <a:r>
+              <a:rPr lang="en-US" dirty="0" err="1" smtClean="0"/>
+              <a:t>sklearn</a:t>
+            </a:r>
+            <a:r>
+              <a:rPr lang="en-US" dirty="0" smtClean="0"/>
+              <a:t>?</a:t>
+            </a:r>
+          </a:p>
+          <a:p>
+            <a:pPr>
+              <a:lnSpc>
+                <a:spcPct val="150000"/>
+              </a:lnSpc>
+            </a:pPr>
+            <a:r>
+              <a:rPr lang="ru-RU" dirty="0" smtClean="0"/>
+              <a:t>классификаторы на </a:t>
+            </a:r>
+            <a:r>
+              <a:rPr lang="ru-RU" dirty="0" err="1" smtClean="0"/>
+              <a:t>датасете</a:t>
+            </a:r>
+            <a:r>
+              <a:rPr lang="ru-RU" dirty="0" smtClean="0"/>
+              <a:t> </a:t>
+            </a:r>
+            <a:r>
+              <a:rPr lang="en-US" dirty="0" smtClean="0"/>
+              <a:t>MNIST</a:t>
+            </a:r>
+          </a:p>
+          <a:p>
+            <a:pPr>
+              <a:lnSpc>
+                <a:spcPct val="150000"/>
+              </a:lnSpc>
+            </a:pPr>
+            <a:r>
+              <a:rPr lang="ru-RU" dirty="0" err="1" smtClean="0"/>
+              <a:t>апи</a:t>
+            </a:r>
+            <a:r>
+              <a:rPr lang="ru-RU" dirty="0" smtClean="0"/>
+              <a:t> для модели на </a:t>
+            </a:r>
+            <a:r>
+              <a:rPr lang="en-US" dirty="0" smtClean="0"/>
+              <a:t>flask</a:t>
+            </a:r>
+          </a:p>
+          <a:p>
+            <a:pPr>
+              <a:lnSpc>
+                <a:spcPct val="150000"/>
+              </a:lnSpc>
+            </a:pPr>
+            <a:r>
+              <a:rPr lang="ru-RU" dirty="0" smtClean="0"/>
+              <a:t>некоторые замечания, вопросы и ответы</a:t>
+            </a:r>
+            <a:endParaRPr lang="ru-RU" dirty="0"/>
+          </a:p>
+        </p:txBody>
+      </p:sp>
+    </p:spTree>
+    <p:extLst>
+      <p:ext uri="{BB962C8B-B14F-4D97-AF65-F5344CB8AC3E}">
+        <p14:creationId xmlns:p14="http://schemas.microsoft.com/office/powerpoint/2010/main" val="2864372834"/>
+      </p:ext>
+    </p:extLst>
+  </p:cSld>
+  <p:clrMapOvr>
+    <a:masterClrMapping/>
+  </p:clrMapOvr>
+  <p:timing>
+    <p:tnLst>
+      <p:par>
+        <p:cTn id="1" dur="indefinite" restart="never" nodeType="tmRoot"/>
+      </p:par>
+    </p:tnLst>
+  </p:timing>
+</p:sld>
+</file>
+
+<file path=ppt/slides/slide20.xml><?xml version="1.0" encoding="utf-8"?>
 <p:sld xmlns:a="http://schemas.openxmlformats.org/drawingml/2006/main" xmlns:r="http://schemas.openxmlformats.org/officeDocument/2006/relationships" xmlns:p="http://schemas.openxmlformats.org/presentationml/2006/main">
   <p:cSld>
     <p:spTree>
@@ -4335,7 +4842,7 @@
 </p:sld>
 </file>
 
-<file path=ppt/slides/slide18.xml><?xml version="1.0" encoding="utf-8"?>
+<file path=ppt/slides/slide21.xml><?xml version="1.0" encoding="utf-8"?>
 <p:sld xmlns:a="http://schemas.openxmlformats.org/drawingml/2006/main" xmlns:r="http://schemas.openxmlformats.org/officeDocument/2006/relationships" xmlns:p="http://schemas.openxmlformats.org/presentationml/2006/main">
   <p:cSld>
     <p:spTree>
@@ -4776,7 +5283,7 @@
 </p:sld>
 </file>
 
-<file path=ppt/slides/slide19.xml><?xml version="1.0" encoding="utf-8"?>
+<file path=ppt/slides/slide22.xml><?xml version="1.0" encoding="utf-8"?>
 <p:sld xmlns:a="http://schemas.openxmlformats.org/drawingml/2006/main" xmlns:r="http://schemas.openxmlformats.org/officeDocument/2006/relationships" xmlns:p="http://schemas.openxmlformats.org/presentationml/2006/main">
   <p:cSld>
     <p:spTree>
@@ -5025,149 +5532,7 @@
 </p:sld>
 </file>
 
-<file path=ppt/slides/slide2.xml><?xml version="1.0" encoding="utf-8"?>
-<p:sld xmlns:a="http://schemas.openxmlformats.org/drawingml/2006/main" xmlns:r="http://schemas.openxmlformats.org/officeDocument/2006/relationships" xmlns:p="http://schemas.openxmlformats.org/presentationml/2006/main">
-  <p:cSld>
-    <p:spTree>
-      <p:nvGrpSpPr>
-        <p:cNvPr id="1" name=""/>
-        <p:cNvGrpSpPr/>
-        <p:nvPr/>
-      </p:nvGrpSpPr>
-      <p:grpSpPr>
-        <a:xfrm>
-          <a:off x="0" y="0"/>
-          <a:ext cx="0" cy="0"/>
-          <a:chOff x="0" y="0"/>
-          <a:chExt cx="0" cy="0"/>
-        </a:xfrm>
-      </p:grpSpPr>
-      <p:sp>
-        <p:nvSpPr>
-          <p:cNvPr id="3" name="Объект 2"/>
-          <p:cNvSpPr>
-            <a:spLocks noGrp="1"/>
-          </p:cNvSpPr>
-          <p:nvPr>
-            <p:ph idx="1"/>
-          </p:nvPr>
-        </p:nvSpPr>
-        <p:spPr>
-          <a:xfrm>
-            <a:off x="467544" y="1124744"/>
-            <a:ext cx="8229600" cy="4525963"/>
-          </a:xfrm>
-        </p:spPr>
-        <p:txBody>
-          <a:bodyPr/>
-          <a:lstStyle/>
-          <a:p>
-            <a:pPr>
-              <a:lnSpc>
-                <a:spcPct val="150000"/>
-              </a:lnSpc>
-            </a:pPr>
-            <a:r>
-              <a:rPr lang="ru-RU" dirty="0" smtClean="0"/>
-              <a:t>что такое «машинка»?</a:t>
-            </a:r>
-          </a:p>
-          <a:p>
-            <a:pPr>
-              <a:lnSpc>
-                <a:spcPct val="150000"/>
-              </a:lnSpc>
-            </a:pPr>
-            <a:r>
-              <a:rPr lang="ru-RU" dirty="0" smtClean="0"/>
-              <a:t>почему </a:t>
-            </a:r>
-            <a:r>
-              <a:rPr lang="en-US" dirty="0" err="1" smtClean="0"/>
-              <a:t>sklearn</a:t>
-            </a:r>
-            <a:r>
-              <a:rPr lang="en-US" dirty="0" smtClean="0"/>
-              <a:t>?</a:t>
-            </a:r>
-          </a:p>
-          <a:p>
-            <a:pPr>
-              <a:lnSpc>
-                <a:spcPct val="150000"/>
-              </a:lnSpc>
-            </a:pPr>
-            <a:r>
-              <a:rPr lang="ru-RU" dirty="0" smtClean="0"/>
-              <a:t>классификаторы на </a:t>
-            </a:r>
-            <a:r>
-              <a:rPr lang="ru-RU" dirty="0" err="1" smtClean="0"/>
-              <a:t>датасете</a:t>
-            </a:r>
-            <a:r>
-              <a:rPr lang="ru-RU" dirty="0" smtClean="0"/>
-              <a:t> </a:t>
-            </a:r>
-            <a:r>
-              <a:rPr lang="en-US" dirty="0" smtClean="0"/>
-              <a:t>MNIST</a:t>
-            </a:r>
-          </a:p>
-          <a:p>
-            <a:pPr>
-              <a:lnSpc>
-                <a:spcPct val="150000"/>
-              </a:lnSpc>
-            </a:pPr>
-            <a:r>
-              <a:rPr lang="ru-RU" dirty="0" err="1" smtClean="0"/>
-              <a:t>апи</a:t>
-            </a:r>
-            <a:r>
-              <a:rPr lang="ru-RU" dirty="0" smtClean="0"/>
-              <a:t> для модели на </a:t>
-            </a:r>
-            <a:r>
-              <a:rPr lang="en-US" dirty="0" smtClean="0"/>
-              <a:t>flask</a:t>
-            </a:r>
-          </a:p>
-          <a:p>
-            <a:pPr>
-              <a:lnSpc>
-                <a:spcPct val="150000"/>
-              </a:lnSpc>
-            </a:pPr>
-            <a:r>
-              <a:rPr lang="ru-RU" dirty="0" smtClean="0"/>
-              <a:t>некоторые замечания, вопросы и ответы</a:t>
-            </a:r>
-            <a:endParaRPr lang="ru-RU" dirty="0"/>
-          </a:p>
-        </p:txBody>
-      </p:sp>
-    </p:spTree>
-    <p:extLst>
-      <p:ext uri="{BB962C8B-B14F-4D97-AF65-F5344CB8AC3E}">
-        <p14:creationId xmlns:p14="http://schemas.microsoft.com/office/powerpoint/2010/main" val="2864372834"/>
-      </p:ext>
-    </p:extLst>
-  </p:cSld>
-  <p:clrMapOvr>
-    <a:masterClrMapping/>
-  </p:clrMapOvr>
-  <p:timing>
-    <p:tnLst>
-      <p:par>
-        <p:cTn id="1" dur="indefinite" restart="never" nodeType="tmRoot"/>
-      </p:par>
-    </p:tnLst>
-  </p:timing>
-</p:sld>
-</file>
-
-<file path=ppt/slides/slide20.xml><?xml version="1.0" encoding="utf-8"?>
+<file path=ppt/slides/slide23.xml><?xml version="1.0" encoding="utf-8"?>
 <p:sld xmlns:a="http://schemas.openxmlformats.org/drawingml/2006/main" xmlns:r="http://schemas.openxmlformats.org/officeDocument/2006/relationships" xmlns:p="http://schemas.openxmlformats.org/presentationml/2006/main">
   <p:cSld>
     <p:spTree>
@@ -5265,7 +5630,7 @@
 </p:sld>
 </file>
 
-<file path=ppt/slides/slide21.xml><?xml version="1.0" encoding="utf-8"?>
+<file path=ppt/slides/slide24.xml><?xml version="1.0" encoding="utf-8"?>
 <p:sld xmlns:a="http://schemas.openxmlformats.org/drawingml/2006/main" xmlns:r="http://schemas.openxmlformats.org/officeDocument/2006/relationships" xmlns:p="http://schemas.openxmlformats.org/presentationml/2006/main">
   <p:cSld>
     <p:spTree>
@@ -5497,7 +5862,7 @@
 </p:sld>
 </file>
 
-<file path=ppt/slides/slide22.xml><?xml version="1.0" encoding="utf-8"?>
+<file path=ppt/slides/slide25.xml><?xml version="1.0" encoding="utf-8"?>
 <p:sld xmlns:a="http://schemas.openxmlformats.org/drawingml/2006/main" xmlns:r="http://schemas.openxmlformats.org/officeDocument/2006/relationships" xmlns:p="http://schemas.openxmlformats.org/presentationml/2006/main">
   <p:cSld>
     <p:spTree>

</xml_diff>